<commit_message>
Add scrollView and txt
</commit_message>
<xml_diff>
--- a/powerpoint/projet_4_powerpoint.pptx
+++ b/powerpoint/projet_4_powerpoint.pptx
@@ -732,10 +732,10 @@
               </a:rPr>
               <a:t> et donc de l’émulateur pour pouvoir utiliser ses API.</a:t>
             </a:r>
-            <a:endParaRPr lang="fr-FR" smtClean="0"/>
-          </a:p>
-          <a:p>
-            <a:endParaRPr lang="fr-FR"/>
+            <a:endParaRPr lang="fr-FR" dirty="0" smtClean="0"/>
+          </a:p>
+          <a:p>
+            <a:endParaRPr lang="fr-FR" dirty="0"/>
           </a:p>
         </p:txBody>
       </p:sp>

</xml_diff>